<commit_message>
update slide presentation, add heatmap result
</commit_message>
<xml_diff>
--- a/SVM/SVM result.pptx
+++ b/SVM/SVM result.pptx
@@ -5118,8 +5118,8 @@
         </p:blipFill>
         <p:spPr>
           <a:xfrm>
-            <a:off x="490925" y="1470025"/>
-            <a:ext cx="5257800" cy="1089373"/>
+            <a:off x="490923" y="1676716"/>
+            <a:ext cx="7147103" cy="1480821"/>
           </a:xfrm>
           <a:prstGeom prst="rect">
             <a:avLst/>
@@ -5140,7 +5140,7 @@
         </p:nvSpPr>
         <p:spPr>
           <a:xfrm>
-            <a:off x="490923" y="1122918"/>
+            <a:off x="490923" y="1279761"/>
             <a:ext cx="4676775" cy="369332"/>
           </a:xfrm>
           <a:prstGeom prst="rect">
@@ -5155,18 +5155,292 @@
           <a:lstStyle/>
           <a:p>
             <a:r>
-              <a:rPr lang="en-US" dirty="0"/>
+              <a:rPr lang="en-US" b="1" dirty="0">
+                <a:solidFill>
+                  <a:schemeClr val="accent1"/>
+                </a:solidFill>
+              </a:rPr>
               <a:t>Average performance metrics on 5-fold</a:t>
             </a:r>
           </a:p>
         </p:txBody>
       </p:sp>
-      <p:sp>
-        <p:nvSpPr>
-          <p:cNvPr id="7" name="TextBox 6">
-            <a:extLst>
-              <a:ext uri="{FF2B5EF4-FFF2-40B4-BE49-F238E27FC236}">
-                <a16:creationId xmlns:a16="http://schemas.microsoft.com/office/drawing/2014/main" id="{0AC2FE34-8CEE-BA74-843E-86C046A318DB}"/>
+      <p:graphicFrame>
+        <p:nvGraphicFramePr>
+          <p:cNvPr id="2" name="Table 2">
+            <a:extLst>
+              <a:ext uri="{FF2B5EF4-FFF2-40B4-BE49-F238E27FC236}">
+                <a16:creationId xmlns:a16="http://schemas.microsoft.com/office/drawing/2014/main" id="{63A4A596-96AD-3579-6437-872AF99B2E42}"/>
+              </a:ext>
+            </a:extLst>
+          </p:cNvPr>
+          <p:cNvGraphicFramePr>
+            <a:graphicFrameLocks noGrp="1"/>
+          </p:cNvGraphicFramePr>
+          <p:nvPr>
+            <p:extLst>
+              <p:ext uri="{D42A27DB-BD31-4B8C-83A1-F6EECF244321}">
+                <p14:modId xmlns:p14="http://schemas.microsoft.com/office/powerpoint/2010/main" val="3264563907"/>
+              </p:ext>
+            </p:extLst>
+          </p:nvPr>
+        </p:nvGraphicFramePr>
+        <p:xfrm>
+          <a:off x="6571617" y="4411664"/>
+          <a:ext cx="5049448" cy="1112520"/>
+        </p:xfrm>
+        <a:graphic>
+          <a:graphicData uri="http://schemas.openxmlformats.org/drawingml/2006/table">
+            <a:tbl>
+              <a:tblPr firstRow="1" bandRow="1">
+                <a:tableStyleId>{5C22544A-7EE6-4342-B048-85BDC9FD1C3A}</a:tableStyleId>
+              </a:tblPr>
+              <a:tblGrid>
+                <a:gridCol w="1262362">
+                  <a:extLst>
+                    <a:ext uri="{9D8B030D-6E8A-4147-A177-3AD203B41FA5}">
+                      <a16:colId xmlns:a16="http://schemas.microsoft.com/office/drawing/2014/main" val="69165248"/>
+                    </a:ext>
+                  </a:extLst>
+                </a:gridCol>
+                <a:gridCol w="1262362">
+                  <a:extLst>
+                    <a:ext uri="{9D8B030D-6E8A-4147-A177-3AD203B41FA5}">
+                      <a16:colId xmlns:a16="http://schemas.microsoft.com/office/drawing/2014/main" val="701884241"/>
+                    </a:ext>
+                  </a:extLst>
+                </a:gridCol>
+                <a:gridCol w="1262362">
+                  <a:extLst>
+                    <a:ext uri="{9D8B030D-6E8A-4147-A177-3AD203B41FA5}">
+                      <a16:colId xmlns:a16="http://schemas.microsoft.com/office/drawing/2014/main" val="1578493202"/>
+                    </a:ext>
+                  </a:extLst>
+                </a:gridCol>
+                <a:gridCol w="1262362">
+                  <a:extLst>
+                    <a:ext uri="{9D8B030D-6E8A-4147-A177-3AD203B41FA5}">
+                      <a16:colId xmlns:a16="http://schemas.microsoft.com/office/drawing/2014/main" val="2847688674"/>
+                    </a:ext>
+                  </a:extLst>
+                </a:gridCol>
+              </a:tblGrid>
+              <a:tr h="370840">
+                <a:tc>
+                  <a:txBody>
+                    <a:bodyPr/>
+                    <a:lstStyle/>
+                    <a:p>
+                      <a:endParaRPr lang="en-US" dirty="0"/>
+                    </a:p>
+                  </a:txBody>
+                  <a:tcPr/>
+                </a:tc>
+                <a:tc>
+                  <a:txBody>
+                    <a:bodyPr/>
+                    <a:lstStyle/>
+                    <a:p>
+                      <a:pPr algn="ctr"/>
+                      <a:r>
+                        <a:rPr lang="en-US" dirty="0"/>
+                        <a:t>Class &lt;30</a:t>
+                      </a:r>
+                    </a:p>
+                  </a:txBody>
+                  <a:tcPr/>
+                </a:tc>
+                <a:tc>
+                  <a:txBody>
+                    <a:bodyPr/>
+                    <a:lstStyle/>
+                    <a:p>
+                      <a:pPr algn="ctr"/>
+                      <a:r>
+                        <a:rPr lang="en-US" dirty="0"/>
+                        <a:t>Class &gt;30</a:t>
+                      </a:r>
+                    </a:p>
+                  </a:txBody>
+                  <a:tcPr/>
+                </a:tc>
+                <a:tc>
+                  <a:txBody>
+                    <a:bodyPr/>
+                    <a:lstStyle/>
+                    <a:p>
+                      <a:pPr algn="ctr"/>
+                      <a:r>
+                        <a:rPr lang="en-US" dirty="0"/>
+                        <a:t>Class No</a:t>
+                      </a:r>
+                    </a:p>
+                  </a:txBody>
+                  <a:tcPr/>
+                </a:tc>
+                <a:extLst>
+                  <a:ext uri="{0D108BD9-81ED-4DB2-BD59-A6C34878D82A}">
+                    <a16:rowId xmlns:a16="http://schemas.microsoft.com/office/drawing/2014/main" val="678772968"/>
+                  </a:ext>
+                </a:extLst>
+              </a:tr>
+              <a:tr h="370840">
+                <a:tc>
+                  <a:txBody>
+                    <a:bodyPr/>
+                    <a:lstStyle/>
+                    <a:p>
+                      <a:r>
+                        <a:rPr lang="en-US" dirty="0"/>
+                        <a:t>Sensitivity</a:t>
+                      </a:r>
+                    </a:p>
+                  </a:txBody>
+                  <a:tcPr/>
+                </a:tc>
+                <a:tc>
+                  <a:txBody>
+                    <a:bodyPr/>
+                    <a:lstStyle/>
+                    <a:p>
+                      <a:r>
+                        <a:rPr lang="en-US" dirty="0"/>
+                        <a:t>0.47593</a:t>
+                      </a:r>
+                    </a:p>
+                  </a:txBody>
+                  <a:tcPr/>
+                </a:tc>
+                <a:tc>
+                  <a:txBody>
+                    <a:bodyPr/>
+                    <a:lstStyle/>
+                    <a:p>
+                      <a:r>
+                        <a:rPr lang="en-US" dirty="0"/>
+                        <a:t>0.4716</a:t>
+                      </a:r>
+                    </a:p>
+                  </a:txBody>
+                  <a:tcPr/>
+                </a:tc>
+                <a:tc>
+                  <a:txBody>
+                    <a:bodyPr/>
+                    <a:lstStyle/>
+                    <a:p>
+                      <a:r>
+                        <a:rPr lang="en-US" dirty="0"/>
+                        <a:t>0.4340</a:t>
+                      </a:r>
+                    </a:p>
+                  </a:txBody>
+                  <a:tcPr/>
+                </a:tc>
+                <a:extLst>
+                  <a:ext uri="{0D108BD9-81ED-4DB2-BD59-A6C34878D82A}">
+                    <a16:rowId xmlns:a16="http://schemas.microsoft.com/office/drawing/2014/main" val="535372995"/>
+                  </a:ext>
+                </a:extLst>
+              </a:tr>
+              <a:tr h="370840">
+                <a:tc>
+                  <a:txBody>
+                    <a:bodyPr/>
+                    <a:lstStyle/>
+                    <a:p>
+                      <a:r>
+                        <a:rPr lang="en-US" dirty="0"/>
+                        <a:t>Specificity</a:t>
+                      </a:r>
+                    </a:p>
+                  </a:txBody>
+                  <a:tcPr/>
+                </a:tc>
+                <a:tc>
+                  <a:txBody>
+                    <a:bodyPr/>
+                    <a:lstStyle/>
+                    <a:p>
+                      <a:r>
+                        <a:rPr lang="en-US" dirty="0"/>
+                        <a:t>0.74247</a:t>
+                      </a:r>
+                    </a:p>
+                  </a:txBody>
+                  <a:tcPr/>
+                </a:tc>
+                <a:tc>
+                  <a:txBody>
+                    <a:bodyPr/>
+                    <a:lstStyle/>
+                    <a:p>
+                      <a:r>
+                        <a:rPr lang="en-US" dirty="0"/>
+                        <a:t>0.6800</a:t>
+                      </a:r>
+                    </a:p>
+                  </a:txBody>
+                  <a:tcPr/>
+                </a:tc>
+                <a:tc>
+                  <a:txBody>
+                    <a:bodyPr/>
+                    <a:lstStyle/>
+                    <a:p>
+                      <a:r>
+                        <a:rPr lang="en-US" dirty="0"/>
+                        <a:t>0.7585</a:t>
+                      </a:r>
+                    </a:p>
+                  </a:txBody>
+                  <a:tcPr/>
+                </a:tc>
+                <a:extLst>
+                  <a:ext uri="{0D108BD9-81ED-4DB2-BD59-A6C34878D82A}">
+                    <a16:rowId xmlns:a16="http://schemas.microsoft.com/office/drawing/2014/main" val="658374476"/>
+                  </a:ext>
+                </a:extLst>
+              </a:tr>
+            </a:tbl>
+          </a:graphicData>
+        </a:graphic>
+      </p:graphicFrame>
+      <p:pic>
+        <p:nvPicPr>
+          <p:cNvPr id="11" name="Picture 10">
+            <a:extLst>
+              <a:ext uri="{FF2B5EF4-FFF2-40B4-BE49-F238E27FC236}">
+                <a16:creationId xmlns:a16="http://schemas.microsoft.com/office/drawing/2014/main" id="{75FEA200-565A-7ACC-2961-7A2B4DC28AFE}"/>
+              </a:ext>
+            </a:extLst>
+          </p:cNvPr>
+          <p:cNvPicPr>
+            <a:picLocks noChangeAspect="1"/>
+          </p:cNvPicPr>
+          <p:nvPr/>
+        </p:nvPicPr>
+        <p:blipFill rotWithShape="1">
+          <a:blip r:embed="rId4"/>
+          <a:srcRect l="452"/>
+          <a:stretch/>
+        </p:blipFill>
+        <p:spPr>
+          <a:xfrm>
+            <a:off x="677615" y="4012883"/>
+            <a:ext cx="5418386" cy="1661643"/>
+          </a:xfrm>
+          <a:prstGeom prst="rect">
+            <a:avLst/>
+          </a:prstGeom>
+        </p:spPr>
+      </p:pic>
+      <p:sp>
+        <p:nvSpPr>
+          <p:cNvPr id="16" name="TextBox 15">
+            <a:extLst>
+              <a:ext uri="{FF2B5EF4-FFF2-40B4-BE49-F238E27FC236}">
+                <a16:creationId xmlns:a16="http://schemas.microsoft.com/office/drawing/2014/main" id="{64803E5D-441B-4F88-9628-E35050EC7CA6}"/>
               </a:ext>
             </a:extLst>
           </p:cNvPr>
@@ -5175,7 +5449,47 @@
         </p:nvSpPr>
         <p:spPr>
           <a:xfrm>
-            <a:off x="433776" y="2721839"/>
+            <a:off x="4543424" y="5830887"/>
+            <a:ext cx="3760470" cy="369332"/>
+          </a:xfrm>
+          <a:prstGeom prst="rect">
+            <a:avLst/>
+          </a:prstGeom>
+          <a:noFill/>
+        </p:spPr>
+        <p:txBody>
+          <a:bodyPr wrap="square" rtlCol="0">
+            <a:spAutoFit/>
+          </a:bodyPr>
+          <a:lstStyle/>
+          <a:p>
+            <a:r>
+              <a:rPr lang="en-US" b="1" dirty="0">
+                <a:solidFill>
+                  <a:schemeClr val="accent1"/>
+                </a:solidFill>
+                <a:latin typeface="Abadi" panose="020B0604020104020204" pitchFamily="34" charset="0"/>
+              </a:rPr>
+              <a:t>Training time: 2hours 22mins 24s</a:t>
+            </a:r>
+          </a:p>
+        </p:txBody>
+      </p:sp>
+      <p:sp>
+        <p:nvSpPr>
+          <p:cNvPr id="17" name="TextBox 16">
+            <a:extLst>
+              <a:ext uri="{FF2B5EF4-FFF2-40B4-BE49-F238E27FC236}">
+                <a16:creationId xmlns:a16="http://schemas.microsoft.com/office/drawing/2014/main" id="{85C96482-3C16-F787-073B-B26E7952AB07}"/>
+              </a:ext>
+            </a:extLst>
+          </p:cNvPr>
+          <p:cNvSpPr txBox="1"/>
+          <p:nvPr/>
+        </p:nvSpPr>
+        <p:spPr>
+          <a:xfrm>
+            <a:off x="490922" y="3428484"/>
             <a:ext cx="4676775" cy="369332"/>
           </a:xfrm>
           <a:prstGeom prst="rect">
@@ -5190,42 +5504,16 @@
           <a:lstStyle/>
           <a:p>
             <a:r>
-              <a:rPr lang="en-US" dirty="0"/>
-              <a:t>Performance metrics on test data</a:t>
-            </a:r>
-          </a:p>
-        </p:txBody>
-      </p:sp>
-      <p:pic>
-        <p:nvPicPr>
-          <p:cNvPr id="10" name="Picture 9">
-            <a:extLst>
-              <a:ext uri="{FF2B5EF4-FFF2-40B4-BE49-F238E27FC236}">
-                <a16:creationId xmlns:a16="http://schemas.microsoft.com/office/drawing/2014/main" id="{B94D0FBF-91CA-E598-E1E6-FD0A810EF01A}"/>
-              </a:ext>
-            </a:extLst>
-          </p:cNvPr>
-          <p:cNvPicPr>
-            <a:picLocks noChangeAspect="1"/>
-          </p:cNvPicPr>
-          <p:nvPr/>
-        </p:nvPicPr>
-        <p:blipFill>
-          <a:blip r:embed="rId4"/>
-          <a:stretch>
-            <a:fillRect/>
-          </a:stretch>
-        </p:blipFill>
-        <p:spPr>
-          <a:xfrm>
-            <a:off x="490923" y="3091171"/>
-            <a:ext cx="4524375" cy="3600450"/>
-          </a:xfrm>
-          <a:prstGeom prst="rect">
-            <a:avLst/>
-          </a:prstGeom>
-        </p:spPr>
-      </p:pic>
+              <a:rPr lang="en-US" b="1" dirty="0">
+                <a:solidFill>
+                  <a:schemeClr val="accent1"/>
+                </a:solidFill>
+              </a:rPr>
+              <a:t>Average performance metrics on Test data</a:t>
+            </a:r>
+          </a:p>
+        </p:txBody>
+      </p:sp>
     </p:spTree>
     <p:extLst>
       <p:ext uri="{BB962C8B-B14F-4D97-AF65-F5344CB8AC3E}">
@@ -6086,10 +6374,10 @@
       </p:sp>
       <p:pic>
         <p:nvPicPr>
-          <p:cNvPr id="6" name="Picture 5">
-            <a:extLst>
-              <a:ext uri="{FF2B5EF4-FFF2-40B4-BE49-F238E27FC236}">
-                <a16:creationId xmlns:a16="http://schemas.microsoft.com/office/drawing/2014/main" id="{0646B8D5-4B71-6B2E-96E0-B07EA7270C50}"/>
+          <p:cNvPr id="13" name="Picture 12">
+            <a:extLst>
+              <a:ext uri="{FF2B5EF4-FFF2-40B4-BE49-F238E27FC236}">
+                <a16:creationId xmlns:a16="http://schemas.microsoft.com/office/drawing/2014/main" id="{FA97D0BB-8420-936F-D0EB-4E9C652239E1}"/>
               </a:ext>
             </a:extLst>
           </p:cNvPr>
@@ -6106,8 +6394,8 @@
         </p:blipFill>
         <p:spPr>
           <a:xfrm>
-            <a:off x="6571683" y="3091171"/>
-            <a:ext cx="4572000" cy="3638550"/>
+            <a:off x="6571683" y="3041071"/>
+            <a:ext cx="4524375" cy="3600450"/>
           </a:xfrm>
           <a:prstGeom prst="rect">
             <a:avLst/>

</xml_diff>

<commit_message>
add svm result figure
</commit_message>
<xml_diff>
--- a/SVM/SVM result.pptx
+++ b/SVM/SVM result.pptx
@@ -203,7 +203,7 @@
           <a:p>
             <a:fld id="{75925159-9BE7-41FD-BD55-FD2BF94EE08D}" type="datetimeFigureOut">
               <a:rPr lang="en-US" smtClean="0"/>
-              <a:t>17-May-22</a:t>
+              <a:t>21-May-22</a:t>
             </a:fld>
             <a:endParaRPr lang="en-US"/>
           </a:p>
@@ -922,7 +922,7 @@
           <a:p>
             <a:fld id="{B4D583F2-624A-4019-AD7B-8C723B971063}" type="datetimeFigureOut">
               <a:rPr lang="en-US" smtClean="0"/>
-              <a:t>17-May-22</a:t>
+              <a:t>21-May-22</a:t>
             </a:fld>
             <a:endParaRPr lang="en-US"/>
           </a:p>
@@ -1120,7 +1120,7 @@
           <a:p>
             <a:fld id="{B4D583F2-624A-4019-AD7B-8C723B971063}" type="datetimeFigureOut">
               <a:rPr lang="en-US" smtClean="0"/>
-              <a:t>17-May-22</a:t>
+              <a:t>21-May-22</a:t>
             </a:fld>
             <a:endParaRPr lang="en-US"/>
           </a:p>
@@ -1328,7 +1328,7 @@
           <a:p>
             <a:fld id="{B4D583F2-624A-4019-AD7B-8C723B971063}" type="datetimeFigureOut">
               <a:rPr lang="en-US" smtClean="0"/>
-              <a:t>17-May-22</a:t>
+              <a:t>21-May-22</a:t>
             </a:fld>
             <a:endParaRPr lang="en-US"/>
           </a:p>
@@ -1526,7 +1526,7 @@
           <a:p>
             <a:fld id="{B4D583F2-624A-4019-AD7B-8C723B971063}" type="datetimeFigureOut">
               <a:rPr lang="en-US" smtClean="0"/>
-              <a:t>17-May-22</a:t>
+              <a:t>21-May-22</a:t>
             </a:fld>
             <a:endParaRPr lang="en-US"/>
           </a:p>
@@ -1801,7 +1801,7 @@
           <a:p>
             <a:fld id="{B4D583F2-624A-4019-AD7B-8C723B971063}" type="datetimeFigureOut">
               <a:rPr lang="en-US" smtClean="0"/>
-              <a:t>17-May-22</a:t>
+              <a:t>21-May-22</a:t>
             </a:fld>
             <a:endParaRPr lang="en-US"/>
           </a:p>
@@ -2066,7 +2066,7 @@
           <a:p>
             <a:fld id="{B4D583F2-624A-4019-AD7B-8C723B971063}" type="datetimeFigureOut">
               <a:rPr lang="en-US" smtClean="0"/>
-              <a:t>17-May-22</a:t>
+              <a:t>21-May-22</a:t>
             </a:fld>
             <a:endParaRPr lang="en-US"/>
           </a:p>
@@ -2478,7 +2478,7 @@
           <a:p>
             <a:fld id="{B4D583F2-624A-4019-AD7B-8C723B971063}" type="datetimeFigureOut">
               <a:rPr lang="en-US" smtClean="0"/>
-              <a:t>17-May-22</a:t>
+              <a:t>21-May-22</a:t>
             </a:fld>
             <a:endParaRPr lang="en-US"/>
           </a:p>
@@ -2619,7 +2619,7 @@
           <a:p>
             <a:fld id="{B4D583F2-624A-4019-AD7B-8C723B971063}" type="datetimeFigureOut">
               <a:rPr lang="en-US" smtClean="0"/>
-              <a:t>17-May-22</a:t>
+              <a:t>21-May-22</a:t>
             </a:fld>
             <a:endParaRPr lang="en-US"/>
           </a:p>
@@ -2732,7 +2732,7 @@
           <a:p>
             <a:fld id="{B4D583F2-624A-4019-AD7B-8C723B971063}" type="datetimeFigureOut">
               <a:rPr lang="en-US" smtClean="0"/>
-              <a:t>17-May-22</a:t>
+              <a:t>21-May-22</a:t>
             </a:fld>
             <a:endParaRPr lang="en-US"/>
           </a:p>
@@ -3043,7 +3043,7 @@
           <a:p>
             <a:fld id="{B4D583F2-624A-4019-AD7B-8C723B971063}" type="datetimeFigureOut">
               <a:rPr lang="en-US" smtClean="0"/>
-              <a:t>17-May-22</a:t>
+              <a:t>21-May-22</a:t>
             </a:fld>
             <a:endParaRPr lang="en-US"/>
           </a:p>
@@ -3331,7 +3331,7 @@
           <a:p>
             <a:fld id="{B4D583F2-624A-4019-AD7B-8C723B971063}" type="datetimeFigureOut">
               <a:rPr lang="en-US" smtClean="0"/>
-              <a:t>17-May-22</a:t>
+              <a:t>21-May-22</a:t>
             </a:fld>
             <a:endParaRPr lang="en-US"/>
           </a:p>
@@ -3572,7 +3572,7 @@
           <a:p>
             <a:fld id="{B4D583F2-624A-4019-AD7B-8C723B971063}" type="datetimeFigureOut">
               <a:rPr lang="en-US" smtClean="0"/>
-              <a:t>17-May-22</a:t>
+              <a:t>21-May-22</a:t>
             </a:fld>
             <a:endParaRPr lang="en-US"/>
           </a:p>

</xml_diff>